<commit_message>
add comments, make more detailed presentation
</commit_message>
<xml_diff>
--- a/slms_structure.pptx
+++ b/slms_structure.pptx
@@ -7,9 +7,12 @@
   <p:sldIdLst>
     <p:sldId id="257" r:id="rId2"/>
     <p:sldId id="256" r:id="rId3"/>
-    <p:sldId id="258" r:id="rId4"/>
-    <p:sldId id="259" r:id="rId5"/>
-    <p:sldId id="261" r:id="rId6"/>
+    <p:sldId id="264" r:id="rId4"/>
+    <p:sldId id="258" r:id="rId5"/>
+    <p:sldId id="262" r:id="rId6"/>
+    <p:sldId id="259" r:id="rId7"/>
+    <p:sldId id="261" r:id="rId8"/>
+    <p:sldId id="263" r:id="rId9"/>
   </p:sldIdLst>
   <p:sldSz cx="12192000" cy="6858000"/>
   <p:notesSz cx="6858000" cy="9144000"/>
@@ -108,6 +111,11 @@
       </a:defRPr>
     </a:lvl9pPr>
   </p:defaultTextStyle>
+  <p:extLst>
+    <p:ext uri="{EFAFB233-063F-42B5-8137-9DF3F51BA10A}">
+      <p15:sldGuideLst xmlns:p15="http://schemas.microsoft.com/office/powerpoint/2012/main"/>
+    </p:ext>
+  </p:extLst>
 </p:presentation>
 </file>
 
@@ -242,7 +250,7 @@
           <a:p>
             <a:fld id="{25572DCA-807F-4F8D-B454-D9E7B9052801}" type="datetimeFigureOut">
               <a:rPr lang="ru-RU" smtClean="0"/>
-              <a:t>05.03.2018</a:t>
+              <a:t>24.04.2018</a:t>
             </a:fld>
             <a:endParaRPr lang="ru-RU"/>
           </a:p>
@@ -412,7 +420,7 @@
           <a:p>
             <a:fld id="{25572DCA-807F-4F8D-B454-D9E7B9052801}" type="datetimeFigureOut">
               <a:rPr lang="ru-RU" smtClean="0"/>
-              <a:t>05.03.2018</a:t>
+              <a:t>24.04.2018</a:t>
             </a:fld>
             <a:endParaRPr lang="ru-RU"/>
           </a:p>
@@ -592,7 +600,7 @@
           <a:p>
             <a:fld id="{25572DCA-807F-4F8D-B454-D9E7B9052801}" type="datetimeFigureOut">
               <a:rPr lang="ru-RU" smtClean="0"/>
-              <a:t>05.03.2018</a:t>
+              <a:t>24.04.2018</a:t>
             </a:fld>
             <a:endParaRPr lang="ru-RU"/>
           </a:p>
@@ -762,7 +770,7 @@
           <a:p>
             <a:fld id="{25572DCA-807F-4F8D-B454-D9E7B9052801}" type="datetimeFigureOut">
               <a:rPr lang="ru-RU" smtClean="0"/>
-              <a:t>05.03.2018</a:t>
+              <a:t>24.04.2018</a:t>
             </a:fld>
             <a:endParaRPr lang="ru-RU"/>
           </a:p>
@@ -1008,7 +1016,7 @@
           <a:p>
             <a:fld id="{25572DCA-807F-4F8D-B454-D9E7B9052801}" type="datetimeFigureOut">
               <a:rPr lang="ru-RU" smtClean="0"/>
-              <a:t>05.03.2018</a:t>
+              <a:t>24.04.2018</a:t>
             </a:fld>
             <a:endParaRPr lang="ru-RU"/>
           </a:p>
@@ -1240,7 +1248,7 @@
           <a:p>
             <a:fld id="{25572DCA-807F-4F8D-B454-D9E7B9052801}" type="datetimeFigureOut">
               <a:rPr lang="ru-RU" smtClean="0"/>
-              <a:t>05.03.2018</a:t>
+              <a:t>24.04.2018</a:t>
             </a:fld>
             <a:endParaRPr lang="ru-RU"/>
           </a:p>
@@ -1607,7 +1615,7 @@
           <a:p>
             <a:fld id="{25572DCA-807F-4F8D-B454-D9E7B9052801}" type="datetimeFigureOut">
               <a:rPr lang="ru-RU" smtClean="0"/>
-              <a:t>05.03.2018</a:t>
+              <a:t>24.04.2018</a:t>
             </a:fld>
             <a:endParaRPr lang="ru-RU"/>
           </a:p>
@@ -1725,7 +1733,7 @@
           <a:p>
             <a:fld id="{25572DCA-807F-4F8D-B454-D9E7B9052801}" type="datetimeFigureOut">
               <a:rPr lang="ru-RU" smtClean="0"/>
-              <a:t>05.03.2018</a:t>
+              <a:t>24.04.2018</a:t>
             </a:fld>
             <a:endParaRPr lang="ru-RU"/>
           </a:p>
@@ -1820,7 +1828,7 @@
           <a:p>
             <a:fld id="{25572DCA-807F-4F8D-B454-D9E7B9052801}" type="datetimeFigureOut">
               <a:rPr lang="ru-RU" smtClean="0"/>
-              <a:t>05.03.2018</a:t>
+              <a:t>24.04.2018</a:t>
             </a:fld>
             <a:endParaRPr lang="ru-RU"/>
           </a:p>
@@ -2097,7 +2105,7 @@
           <a:p>
             <a:fld id="{25572DCA-807F-4F8D-B454-D9E7B9052801}" type="datetimeFigureOut">
               <a:rPr lang="ru-RU" smtClean="0"/>
-              <a:t>05.03.2018</a:t>
+              <a:t>24.04.2018</a:t>
             </a:fld>
             <a:endParaRPr lang="ru-RU"/>
           </a:p>
@@ -2350,7 +2358,7 @@
           <a:p>
             <a:fld id="{25572DCA-807F-4F8D-B454-D9E7B9052801}" type="datetimeFigureOut">
               <a:rPr lang="ru-RU" smtClean="0"/>
-              <a:t>05.03.2018</a:t>
+              <a:t>24.04.2018</a:t>
             </a:fld>
             <a:endParaRPr lang="ru-RU"/>
           </a:p>
@@ -2563,7 +2571,7 @@
           <a:p>
             <a:fld id="{25572DCA-807F-4F8D-B454-D9E7B9052801}" type="datetimeFigureOut">
               <a:rPr lang="ru-RU" smtClean="0"/>
-              <a:t>05.03.2018</a:t>
+              <a:t>24.04.2018</a:t>
             </a:fld>
             <a:endParaRPr lang="ru-RU"/>
           </a:p>
@@ -3107,6 +3115,35 @@
           </a:prstGeom>
         </p:spPr>
       </p:pic>
+      <p:sp>
+        <p:nvSpPr>
+          <p:cNvPr id="5" name="TextBox 4"/>
+          <p:cNvSpPr txBox="1"/>
+          <p:nvPr/>
+        </p:nvSpPr>
+        <p:spPr>
+          <a:xfrm>
+            <a:off x="8778240" y="3161211"/>
+            <a:ext cx="3056709" cy="1446550"/>
+          </a:xfrm>
+          <a:prstGeom prst="rect">
+            <a:avLst/>
+          </a:prstGeom>
+          <a:noFill/>
+        </p:spPr>
+        <p:txBody>
+          <a:bodyPr wrap="square" rtlCol="0">
+            <a:spAutoFit/>
+          </a:bodyPr>
+          <a:lstStyle/>
+          <a:p>
+            <a:r>
+              <a:rPr lang="en-US" sz="4400" dirty="0" smtClean="0"/>
+              <a:t>Structure, main files</a:t>
+            </a:r>
+          </a:p>
+        </p:txBody>
+      </p:sp>
     </p:spTree>
     <p:extLst>
       <p:ext uri="{BB962C8B-B14F-4D97-AF65-F5344CB8AC3E}">
@@ -3154,53 +3191,48 @@
             <p:ph type="title"/>
           </p:nvPr>
         </p:nvSpPr>
-        <p:spPr/>
-        <p:txBody>
-          <a:bodyPr/>
-          <a:lstStyle/>
-          <a:p>
-            <a:r>
-              <a:rPr lang="en-US" dirty="0" err="1" smtClean="0"/>
-              <a:t>Users.json</a:t>
-            </a:r>
+        <p:spPr>
+          <a:xfrm>
+            <a:off x="838200" y="365124"/>
+            <a:ext cx="10515600" cy="4598761"/>
+          </a:xfrm>
+        </p:spPr>
+        <p:txBody>
+          <a:bodyPr>
+            <a:normAutofit/>
+          </a:bodyPr>
+          <a:lstStyle/>
+          <a:p>
             <a:r>
               <a:rPr lang="en-US" dirty="0" smtClean="0"/>
-              <a:t> – users templates for database </a:t>
+              <a:t>MongoDB is used as a database, we store all data in JSON (or BSON). So are configuration files. </a:t>
+            </a:r>
+            <a:br>
+              <a:rPr lang="en-US" dirty="0" smtClean="0"/>
+            </a:br>
+            <a:r>
+              <a:rPr lang="en-US" dirty="0" smtClean="0"/>
+              <a:t/>
+            </a:r>
+            <a:br>
+              <a:rPr lang="en-US" dirty="0" smtClean="0"/>
+            </a:br>
+            <a:r>
+              <a:rPr lang="en-US" dirty="0" smtClean="0"/>
+              <a:t>The </a:t>
+            </a:r>
+            <a:r>
+              <a:rPr lang="en-US" dirty="0"/>
+              <a:t>app is server based with multiple of routes.</a:t>
             </a:r>
             <a:endParaRPr lang="ru-RU" dirty="0"/>
           </a:p>
         </p:txBody>
       </p:sp>
-      <p:pic>
-        <p:nvPicPr>
-          <p:cNvPr id="4" name="Объект 3"/>
-          <p:cNvPicPr>
-            <a:picLocks noGrp="1" noChangeAspect="1"/>
-          </p:cNvPicPr>
-          <p:nvPr>
-            <p:ph idx="1"/>
-          </p:nvPr>
-        </p:nvPicPr>
-        <p:blipFill>
-          <a:blip r:embed="rId2"/>
-          <a:stretch>
-            <a:fillRect/>
-          </a:stretch>
-        </p:blipFill>
-        <p:spPr>
-          <a:xfrm>
-            <a:off x="2303144" y="1581785"/>
-            <a:ext cx="7585712" cy="4846139"/>
-          </a:xfrm>
-          <a:prstGeom prst="rect">
-            <a:avLst/>
-          </a:prstGeom>
-        </p:spPr>
-      </p:pic>
     </p:spTree>
     <p:extLst>
       <p:ext uri="{BB962C8B-B14F-4D97-AF65-F5344CB8AC3E}">
-        <p14:creationId xmlns:p14="http://schemas.microsoft.com/office/powerpoint/2010/main" val="868303674"/>
+        <p14:creationId xmlns:p14="http://schemas.microsoft.com/office/powerpoint/2010/main" val="2753255325"/>
       </p:ext>
     </p:extLst>
   </p:cSld>
@@ -3251,15 +3283,11 @@
           <a:p>
             <a:r>
               <a:rPr lang="en-US" dirty="0" err="1" smtClean="0"/>
-              <a:t>Documents.json</a:t>
-            </a:r>
-            <a:r>
-              <a:rPr lang="en-US" dirty="0"/>
-              <a:t> </a:t>
+              <a:t>Users.json</a:t>
             </a:r>
             <a:r>
               <a:rPr lang="en-US" dirty="0" smtClean="0"/>
-              <a:t>– documents templates for database </a:t>
+              <a:t>. Basically templates to store users in database.</a:t>
             </a:r>
             <a:endParaRPr lang="ru-RU" dirty="0"/>
           </a:p>
@@ -3275,23 +3303,18 @@
             <p:ph idx="1"/>
           </p:nvPr>
         </p:nvSpPr>
-        <p:spPr>
-          <a:xfrm>
-            <a:off x="1595846" y="2506662"/>
-            <a:ext cx="10515600" cy="4351338"/>
-          </a:xfrm>
-        </p:spPr>
-        <p:txBody>
-          <a:bodyPr/>
-          <a:lstStyle/>
-          <a:p>
-            <a:endParaRPr lang="ru-RU" dirty="0"/>
+        <p:spPr/>
+        <p:txBody>
+          <a:bodyPr/>
+          <a:lstStyle/>
+          <a:p>
+            <a:endParaRPr lang="ru-RU"/>
           </a:p>
         </p:txBody>
       </p:sp>
       <p:pic>
         <p:nvPicPr>
-          <p:cNvPr id="4" name="Рисунок 3"/>
+          <p:cNvPr id="7" name="Рисунок 6"/>
           <p:cNvPicPr>
             <a:picLocks noChangeAspect="1"/>
           </p:cNvPicPr>
@@ -3305,8 +3328,8 @@
         </p:blipFill>
         <p:spPr>
           <a:xfrm>
-            <a:off x="2103120" y="1690688"/>
-            <a:ext cx="7985760" cy="5004553"/>
+            <a:off x="2007802" y="1825625"/>
+            <a:ext cx="7619048" cy="3971429"/>
           </a:xfrm>
           <a:prstGeom prst="rect">
             <a:avLst/>
@@ -3316,7 +3339,7 @@
     </p:spTree>
     <p:extLst>
       <p:ext uri="{BB962C8B-B14F-4D97-AF65-F5344CB8AC3E}">
-        <p14:creationId xmlns:p14="http://schemas.microsoft.com/office/powerpoint/2010/main" val="1801375978"/>
+        <p14:creationId xmlns:p14="http://schemas.microsoft.com/office/powerpoint/2010/main" val="868303674"/>
       </p:ext>
     </p:extLst>
   </p:cSld>
@@ -3360,12 +3383,38 @@
             <p:ph type="title"/>
           </p:nvPr>
         </p:nvSpPr>
-        <p:spPr>
-          <a:xfrm>
-            <a:off x="838200" y="251914"/>
-            <a:ext cx="10515600" cy="1325563"/>
-          </a:xfrm>
-        </p:spPr>
+        <p:spPr/>
+        <p:txBody>
+          <a:bodyPr/>
+          <a:lstStyle/>
+          <a:p>
+            <a:r>
+              <a:rPr lang="en-US" dirty="0" smtClean="0"/>
+              <a:t>			</a:t>
+            </a:r>
+            <a:r>
+              <a:rPr lang="en-US" dirty="0" err="1" smtClean="0"/>
+              <a:t>Users.json</a:t>
+            </a:r>
+            <a:r>
+              <a:rPr lang="en-US" dirty="0" smtClean="0"/>
+              <a:t> (cont.)</a:t>
+            </a:r>
+            <a:endParaRPr lang="ru-RU" dirty="0"/>
+          </a:p>
+        </p:txBody>
+      </p:sp>
+      <p:sp>
+        <p:nvSpPr>
+          <p:cNvPr id="3" name="Объект 2"/>
+          <p:cNvSpPr>
+            <a:spLocks noGrp="1"/>
+          </p:cNvSpPr>
+          <p:nvPr>
+            <p:ph idx="1"/>
+          </p:nvPr>
+        </p:nvSpPr>
+        <p:spPr/>
         <p:txBody>
           <a:bodyPr/>
           <a:lstStyle/>
@@ -3376,13 +3425,11 @@
       </p:sp>
       <p:pic>
         <p:nvPicPr>
-          <p:cNvPr id="4" name="Объект 3"/>
+          <p:cNvPr id="5" name="Рисунок 4"/>
           <p:cNvPicPr>
-            <a:picLocks noGrp="1" noChangeAspect="1"/>
+            <a:picLocks noChangeAspect="1"/>
           </p:cNvPicPr>
-          <p:nvPr>
-            <p:ph idx="1"/>
-          </p:nvPr>
+          <p:nvPr/>
         </p:nvPicPr>
         <p:blipFill>
           <a:blip r:embed="rId2"/>
@@ -3392,8 +3439,481 @@
         </p:blipFill>
         <p:spPr>
           <a:xfrm>
-            <a:off x="104504" y="738103"/>
-            <a:ext cx="3228571" cy="2371429"/>
+            <a:off x="1765501" y="1690688"/>
+            <a:ext cx="8295238" cy="4352381"/>
+          </a:xfrm>
+          <a:prstGeom prst="rect">
+            <a:avLst/>
+          </a:prstGeom>
+        </p:spPr>
+      </p:pic>
+    </p:spTree>
+    <p:extLst>
+      <p:ext uri="{BB962C8B-B14F-4D97-AF65-F5344CB8AC3E}">
+        <p14:creationId xmlns:p14="http://schemas.microsoft.com/office/powerpoint/2010/main" val="180471694"/>
+      </p:ext>
+    </p:extLst>
+  </p:cSld>
+  <p:clrMapOvr>
+    <a:masterClrMapping/>
+  </p:clrMapOvr>
+  <p:timing>
+    <p:tnLst>
+      <p:par>
+        <p:cTn id="1" dur="indefinite" restart="never" nodeType="tmRoot"/>
+      </p:par>
+    </p:tnLst>
+  </p:timing>
+</p:sld>
+</file>
+
+<file path=ppt/slides/slide6.xml><?xml version="1.0" encoding="utf-8"?>
+<p:sld xmlns:a="http://schemas.openxmlformats.org/drawingml/2006/main" xmlns:r="http://schemas.openxmlformats.org/officeDocument/2006/relationships" xmlns:p="http://schemas.openxmlformats.org/presentationml/2006/main">
+  <p:cSld>
+    <p:spTree>
+      <p:nvGrpSpPr>
+        <p:cNvPr id="1" name=""/>
+        <p:cNvGrpSpPr/>
+        <p:nvPr/>
+      </p:nvGrpSpPr>
+      <p:grpSpPr>
+        <a:xfrm>
+          <a:off x="0" y="0"/>
+          <a:ext cx="0" cy="0"/>
+          <a:chOff x="0" y="0"/>
+          <a:chExt cx="0" cy="0"/>
+        </a:xfrm>
+      </p:grpSpPr>
+      <p:sp>
+        <p:nvSpPr>
+          <p:cNvPr id="2" name="Заголовок 1"/>
+          <p:cNvSpPr>
+            <a:spLocks noGrp="1"/>
+          </p:cNvSpPr>
+          <p:nvPr>
+            <p:ph type="title"/>
+          </p:nvPr>
+        </p:nvSpPr>
+        <p:spPr/>
+        <p:txBody>
+          <a:bodyPr/>
+          <a:lstStyle/>
+          <a:p>
+            <a:r>
+              <a:rPr lang="en-US" dirty="0" err="1" smtClean="0"/>
+              <a:t>Documents.json</a:t>
+            </a:r>
+            <a:r>
+              <a:rPr lang="en-US" dirty="0"/>
+              <a:t> </a:t>
+            </a:r>
+            <a:r>
+              <a:rPr lang="en-US" dirty="0" smtClean="0"/>
+              <a:t>– documents templates for database </a:t>
+            </a:r>
+            <a:endParaRPr lang="ru-RU" dirty="0"/>
+          </a:p>
+        </p:txBody>
+      </p:sp>
+      <p:pic>
+        <p:nvPicPr>
+          <p:cNvPr id="5" name="Объект 4"/>
+          <p:cNvPicPr>
+            <a:picLocks noGrp="1" noChangeAspect="1"/>
+          </p:cNvPicPr>
+          <p:nvPr>
+            <p:ph idx="1"/>
+          </p:nvPr>
+        </p:nvPicPr>
+        <p:blipFill>
+          <a:blip r:embed="rId2"/>
+          <a:stretch>
+            <a:fillRect/>
+          </a:stretch>
+        </p:blipFill>
+        <p:spPr>
+          <a:xfrm>
+            <a:off x="1781398" y="1922240"/>
+            <a:ext cx="7914286" cy="4057143"/>
+          </a:xfrm>
+          <a:prstGeom prst="rect">
+            <a:avLst/>
+          </a:prstGeom>
+        </p:spPr>
+      </p:pic>
+    </p:spTree>
+    <p:extLst>
+      <p:ext uri="{BB962C8B-B14F-4D97-AF65-F5344CB8AC3E}">
+        <p14:creationId xmlns:p14="http://schemas.microsoft.com/office/powerpoint/2010/main" val="1801375978"/>
+      </p:ext>
+    </p:extLst>
+  </p:cSld>
+  <p:clrMapOvr>
+    <a:masterClrMapping/>
+  </p:clrMapOvr>
+  <p:timing>
+    <p:tnLst>
+      <p:par>
+        <p:cTn id="1" dur="indefinite" restart="never" nodeType="tmRoot"/>
+      </p:par>
+    </p:tnLst>
+  </p:timing>
+</p:sld>
+</file>
+
+<file path=ppt/slides/slide7.xml><?xml version="1.0" encoding="utf-8"?>
+<p:sld xmlns:a="http://schemas.openxmlformats.org/drawingml/2006/main" xmlns:r="http://schemas.openxmlformats.org/officeDocument/2006/relationships" xmlns:p="http://schemas.openxmlformats.org/presentationml/2006/main">
+  <p:cSld>
+    <p:spTree>
+      <p:nvGrpSpPr>
+        <p:cNvPr id="1" name=""/>
+        <p:cNvGrpSpPr/>
+        <p:nvPr/>
+      </p:nvGrpSpPr>
+      <p:grpSpPr>
+        <a:xfrm>
+          <a:off x="0" y="0"/>
+          <a:ext cx="0" cy="0"/>
+          <a:chOff x="0" y="0"/>
+          <a:chExt cx="0" cy="0"/>
+        </a:xfrm>
+      </p:grpSpPr>
+      <p:pic>
+        <p:nvPicPr>
+          <p:cNvPr id="5" name="Рисунок 4"/>
+          <p:cNvPicPr>
+            <a:picLocks noChangeAspect="1"/>
+          </p:cNvPicPr>
+          <p:nvPr/>
+        </p:nvPicPr>
+        <p:blipFill>
+          <a:blip r:embed="rId2"/>
+          <a:stretch>
+            <a:fillRect/>
+          </a:stretch>
+        </p:blipFill>
+        <p:spPr>
+          <a:xfrm>
+            <a:off x="4319110" y="622033"/>
+            <a:ext cx="3238095" cy="2428571"/>
+          </a:xfrm>
+          <a:prstGeom prst="rect">
+            <a:avLst/>
+          </a:prstGeom>
+        </p:spPr>
+      </p:pic>
+      <p:pic>
+        <p:nvPicPr>
+          <p:cNvPr id="6" name="Рисунок 5"/>
+          <p:cNvPicPr>
+            <a:picLocks noChangeAspect="1"/>
+          </p:cNvPicPr>
+          <p:nvPr/>
+        </p:nvPicPr>
+        <p:blipFill>
+          <a:blip r:embed="rId3"/>
+          <a:stretch>
+            <a:fillRect/>
+          </a:stretch>
+        </p:blipFill>
+        <p:spPr>
+          <a:xfrm>
+            <a:off x="8307230" y="2262930"/>
+            <a:ext cx="2628571" cy="2390476"/>
+          </a:xfrm>
+          <a:prstGeom prst="rect">
+            <a:avLst/>
+          </a:prstGeom>
+        </p:spPr>
+      </p:pic>
+      <p:pic>
+        <p:nvPicPr>
+          <p:cNvPr id="7" name="Рисунок 6"/>
+          <p:cNvPicPr>
+            <a:picLocks noChangeAspect="1"/>
+          </p:cNvPicPr>
+          <p:nvPr/>
+        </p:nvPicPr>
+        <p:blipFill>
+          <a:blip r:embed="rId4"/>
+          <a:stretch>
+            <a:fillRect/>
+          </a:stretch>
+        </p:blipFill>
+        <p:spPr>
+          <a:xfrm>
+            <a:off x="1340513" y="3806805"/>
+            <a:ext cx="2228571" cy="1809524"/>
+          </a:xfrm>
+          <a:prstGeom prst="rect">
+            <a:avLst/>
+          </a:prstGeom>
+        </p:spPr>
+      </p:pic>
+      <p:sp>
+        <p:nvSpPr>
+          <p:cNvPr id="8" name="TextBox 7"/>
+          <p:cNvSpPr txBox="1"/>
+          <p:nvPr/>
+        </p:nvSpPr>
+        <p:spPr>
+          <a:xfrm>
+            <a:off x="1340513" y="3135003"/>
+            <a:ext cx="2413628" cy="646331"/>
+          </a:xfrm>
+          <a:prstGeom prst="rect">
+            <a:avLst/>
+          </a:prstGeom>
+          <a:noFill/>
+        </p:spPr>
+        <p:txBody>
+          <a:bodyPr wrap="square" rtlCol="0">
+            <a:spAutoFit/>
+          </a:bodyPr>
+          <a:lstStyle/>
+          <a:p>
+            <a:r>
+              <a:rPr lang="en-US" dirty="0" smtClean="0"/>
+              <a:t>Copy the book with id=2 in the library</a:t>
+            </a:r>
+          </a:p>
+        </p:txBody>
+      </p:sp>
+      <p:sp>
+        <p:nvSpPr>
+          <p:cNvPr id="10" name="TextBox 9"/>
+          <p:cNvSpPr txBox="1"/>
+          <p:nvPr/>
+        </p:nvSpPr>
+        <p:spPr>
+          <a:xfrm>
+            <a:off x="4848496" y="325819"/>
+            <a:ext cx="1994263" cy="369332"/>
+          </a:xfrm>
+          <a:prstGeom prst="rect">
+            <a:avLst/>
+          </a:prstGeom>
+          <a:noFill/>
+        </p:spPr>
+        <p:txBody>
+          <a:bodyPr wrap="square" rtlCol="0">
+            <a:spAutoFit/>
+          </a:bodyPr>
+          <a:lstStyle/>
+          <a:p>
+            <a:r>
+              <a:rPr lang="en-US" dirty="0" smtClean="0"/>
+              <a:t>Student example</a:t>
+            </a:r>
+            <a:endParaRPr lang="ru-RU" dirty="0"/>
+          </a:p>
+        </p:txBody>
+      </p:sp>
+      <p:sp>
+        <p:nvSpPr>
+          <p:cNvPr id="11" name="TextBox 10"/>
+          <p:cNvSpPr txBox="1"/>
+          <p:nvPr/>
+        </p:nvSpPr>
+        <p:spPr>
+          <a:xfrm>
+            <a:off x="8412479" y="1710580"/>
+            <a:ext cx="1968138" cy="369332"/>
+          </a:xfrm>
+          <a:prstGeom prst="rect">
+            <a:avLst/>
+          </a:prstGeom>
+          <a:noFill/>
+        </p:spPr>
+        <p:txBody>
+          <a:bodyPr wrap="square" rtlCol="0">
+            <a:spAutoFit/>
+          </a:bodyPr>
+          <a:lstStyle/>
+          <a:p>
+            <a:r>
+              <a:rPr lang="en-US" dirty="0" smtClean="0"/>
+              <a:t>Book example</a:t>
+            </a:r>
+          </a:p>
+        </p:txBody>
+      </p:sp>
+      <p:sp>
+        <p:nvSpPr>
+          <p:cNvPr id="15" name="TextBox 14"/>
+          <p:cNvSpPr txBox="1"/>
+          <p:nvPr/>
+        </p:nvSpPr>
+        <p:spPr>
+          <a:xfrm>
+            <a:off x="4691743" y="2927046"/>
+            <a:ext cx="2307771" cy="923330"/>
+          </a:xfrm>
+          <a:prstGeom prst="rect">
+            <a:avLst/>
+          </a:prstGeom>
+          <a:noFill/>
+        </p:spPr>
+        <p:txBody>
+          <a:bodyPr wrap="square" rtlCol="0">
+            <a:spAutoFit/>
+          </a:bodyPr>
+          <a:lstStyle/>
+          <a:p>
+            <a:r>
+              <a:rPr lang="en-US" dirty="0" smtClean="0"/>
+              <a:t>Copy of the book with </a:t>
+            </a:r>
+            <a:r>
+              <a:rPr lang="en-US" dirty="0"/>
+              <a:t>id=2 </a:t>
+            </a:r>
+            <a:r>
+              <a:rPr lang="en-US" dirty="0" smtClean="0"/>
+              <a:t>in </a:t>
+            </a:r>
+            <a:r>
+              <a:rPr lang="en-US" dirty="0"/>
+              <a:t>the hands of the user</a:t>
+            </a:r>
+            <a:endParaRPr lang="ru-RU" dirty="0"/>
+          </a:p>
+        </p:txBody>
+      </p:sp>
+      <p:sp>
+        <p:nvSpPr>
+          <p:cNvPr id="3" name="TextBox 2"/>
+          <p:cNvSpPr txBox="1"/>
+          <p:nvPr/>
+        </p:nvSpPr>
+        <p:spPr>
+          <a:xfrm>
+            <a:off x="1193076" y="369990"/>
+            <a:ext cx="2124891" cy="2308324"/>
+          </a:xfrm>
+          <a:prstGeom prst="rect">
+            <a:avLst/>
+          </a:prstGeom>
+          <a:noFill/>
+        </p:spPr>
+        <p:txBody>
+          <a:bodyPr wrap="square" rtlCol="0">
+            <a:spAutoFit/>
+          </a:bodyPr>
+          <a:lstStyle/>
+          <a:p>
+            <a:r>
+              <a:rPr lang="en-US" sz="3600" dirty="0" smtClean="0"/>
+              <a:t>Examples of database entries</a:t>
+            </a:r>
+            <a:endParaRPr lang="ru-RU" sz="3600" dirty="0"/>
+          </a:p>
+        </p:txBody>
+      </p:sp>
+      <p:pic>
+        <p:nvPicPr>
+          <p:cNvPr id="12" name="Рисунок 11"/>
+          <p:cNvPicPr>
+            <a:picLocks noChangeAspect="1"/>
+          </p:cNvPicPr>
+          <p:nvPr/>
+        </p:nvPicPr>
+        <p:blipFill>
+          <a:blip r:embed="rId5"/>
+          <a:stretch>
+            <a:fillRect/>
+          </a:stretch>
+        </p:blipFill>
+        <p:spPr>
+          <a:xfrm>
+            <a:off x="4643063" y="4073472"/>
+            <a:ext cx="2714286" cy="1542857"/>
+          </a:xfrm>
+          <a:prstGeom prst="rect">
+            <a:avLst/>
+          </a:prstGeom>
+        </p:spPr>
+      </p:pic>
+    </p:spTree>
+    <p:extLst>
+      <p:ext uri="{BB962C8B-B14F-4D97-AF65-F5344CB8AC3E}">
+        <p14:creationId xmlns:p14="http://schemas.microsoft.com/office/powerpoint/2010/main" val="3804174267"/>
+      </p:ext>
+    </p:extLst>
+  </p:cSld>
+  <p:clrMapOvr>
+    <a:masterClrMapping/>
+  </p:clrMapOvr>
+  <p:timing>
+    <p:tnLst>
+      <p:par>
+        <p:cTn id="1" dur="indefinite" restart="never" nodeType="tmRoot"/>
+      </p:par>
+    </p:tnLst>
+  </p:timing>
+</p:sld>
+</file>
+
+<file path=ppt/slides/slide8.xml><?xml version="1.0" encoding="utf-8"?>
+<p:sld xmlns:a="http://schemas.openxmlformats.org/drawingml/2006/main" xmlns:r="http://schemas.openxmlformats.org/officeDocument/2006/relationships" xmlns:p="http://schemas.openxmlformats.org/presentationml/2006/main">
+  <p:cSld>
+    <p:spTree>
+      <p:nvGrpSpPr>
+        <p:cNvPr id="1" name=""/>
+        <p:cNvGrpSpPr/>
+        <p:nvPr/>
+      </p:nvGrpSpPr>
+      <p:grpSpPr>
+        <a:xfrm>
+          <a:off x="0" y="0"/>
+          <a:ext cx="0" cy="0"/>
+          <a:chOff x="0" y="0"/>
+          <a:chExt cx="0" cy="0"/>
+        </a:xfrm>
+      </p:grpSpPr>
+      <p:sp>
+        <p:nvSpPr>
+          <p:cNvPr id="2" name="Заголовок 1"/>
+          <p:cNvSpPr>
+            <a:spLocks noGrp="1"/>
+          </p:cNvSpPr>
+          <p:nvPr>
+            <p:ph type="title"/>
+          </p:nvPr>
+        </p:nvSpPr>
+        <p:spPr/>
+        <p:txBody>
+          <a:bodyPr/>
+          <a:lstStyle/>
+          <a:p>
+            <a:r>
+              <a:rPr lang="en-US" dirty="0" smtClean="0"/>
+              <a:t>More examples</a:t>
+            </a:r>
+            <a:endParaRPr lang="ru-RU" dirty="0"/>
+          </a:p>
+        </p:txBody>
+      </p:sp>
+      <p:pic>
+        <p:nvPicPr>
+          <p:cNvPr id="4" name="Объект 3"/>
+          <p:cNvPicPr>
+            <a:picLocks noGrp="1" noChangeAspect="1"/>
+          </p:cNvPicPr>
+          <p:nvPr>
+            <p:ph idx="1"/>
+          </p:nvPr>
+        </p:nvPicPr>
+        <p:blipFill>
+          <a:blip r:embed="rId2"/>
+          <a:stretch>
+            <a:fillRect/>
+          </a:stretch>
+        </p:blipFill>
+        <p:spPr>
+          <a:xfrm>
+            <a:off x="515757" y="1690688"/>
+            <a:ext cx="2904762" cy="2114286"/>
           </a:xfrm>
           <a:prstGeom prst="rect">
             <a:avLst/>
@@ -3416,8 +3936,8 @@
         </p:blipFill>
         <p:spPr>
           <a:xfrm>
-            <a:off x="3754141" y="680961"/>
-            <a:ext cx="3238095" cy="2428571"/>
+            <a:off x="5234324" y="1814636"/>
+            <a:ext cx="2352381" cy="1428571"/>
           </a:xfrm>
           <a:prstGeom prst="rect">
             <a:avLst/>
@@ -3440,8 +3960,8 @@
         </p:blipFill>
         <p:spPr>
           <a:xfrm>
-            <a:off x="7089485" y="613172"/>
-            <a:ext cx="2628571" cy="2390476"/>
+            <a:off x="9400511" y="1814636"/>
+            <a:ext cx="1923810" cy="1323810"/>
           </a:xfrm>
           <a:prstGeom prst="rect">
             <a:avLst/>
@@ -3464,177 +3984,17 @@
         </p:blipFill>
         <p:spPr>
           <a:xfrm>
-            <a:off x="1340513" y="3806805"/>
-            <a:ext cx="2228571" cy="1809524"/>
+            <a:off x="8152892" y="3804974"/>
+            <a:ext cx="3171429" cy="2057143"/>
           </a:xfrm>
           <a:prstGeom prst="rect">
             <a:avLst/>
           </a:prstGeom>
         </p:spPr>
       </p:pic>
-      <p:sp>
-        <p:nvSpPr>
-          <p:cNvPr id="8" name="TextBox 7"/>
-          <p:cNvSpPr txBox="1"/>
-          <p:nvPr/>
-        </p:nvSpPr>
-        <p:spPr>
-          <a:xfrm>
-            <a:off x="1340513" y="3135003"/>
-            <a:ext cx="2413628" cy="646331"/>
-          </a:xfrm>
-          <a:prstGeom prst="rect">
-            <a:avLst/>
-          </a:prstGeom>
-          <a:noFill/>
-        </p:spPr>
-        <p:txBody>
-          <a:bodyPr wrap="square" rtlCol="0">
-            <a:spAutoFit/>
-          </a:bodyPr>
-          <a:lstStyle/>
-          <a:p>
-            <a:r>
-              <a:rPr lang="en-US" dirty="0" smtClean="0"/>
-              <a:t>Copy the book with id=2 in the library</a:t>
-            </a:r>
-          </a:p>
-        </p:txBody>
-      </p:sp>
-      <p:sp>
-        <p:nvSpPr>
-          <p:cNvPr id="9" name="TextBox 8"/>
-          <p:cNvSpPr txBox="1"/>
-          <p:nvPr/>
-        </p:nvSpPr>
-        <p:spPr>
-          <a:xfrm>
-            <a:off x="496389" y="365125"/>
-            <a:ext cx="1828800" cy="646331"/>
-          </a:xfrm>
-          <a:prstGeom prst="rect">
-            <a:avLst/>
-          </a:prstGeom>
-          <a:noFill/>
-        </p:spPr>
-        <p:txBody>
-          <a:bodyPr wrap="square" rtlCol="0">
-            <a:spAutoFit/>
-          </a:bodyPr>
-          <a:lstStyle/>
-          <a:p>
-            <a:r>
-              <a:rPr lang="en-US" dirty="0" smtClean="0"/>
-              <a:t>Librarian example</a:t>
-            </a:r>
-            <a:endParaRPr lang="ru-RU" dirty="0"/>
-          </a:p>
-        </p:txBody>
-      </p:sp>
-      <p:sp>
-        <p:nvSpPr>
-          <p:cNvPr id="10" name="TextBox 9"/>
-          <p:cNvSpPr txBox="1"/>
-          <p:nvPr/>
-        </p:nvSpPr>
-        <p:spPr>
-          <a:xfrm>
-            <a:off x="4005943" y="243840"/>
-            <a:ext cx="1994263" cy="369332"/>
-          </a:xfrm>
-          <a:prstGeom prst="rect">
-            <a:avLst/>
-          </a:prstGeom>
-          <a:noFill/>
-        </p:spPr>
-        <p:txBody>
-          <a:bodyPr wrap="square" rtlCol="0">
-            <a:spAutoFit/>
-          </a:bodyPr>
-          <a:lstStyle/>
-          <a:p>
-            <a:r>
-              <a:rPr lang="en-US" dirty="0" smtClean="0"/>
-              <a:t>Student example</a:t>
-            </a:r>
-            <a:endParaRPr lang="ru-RU" dirty="0"/>
-          </a:p>
-        </p:txBody>
-      </p:sp>
-      <p:sp>
-        <p:nvSpPr>
-          <p:cNvPr id="11" name="TextBox 10"/>
-          <p:cNvSpPr txBox="1"/>
-          <p:nvPr/>
-        </p:nvSpPr>
-        <p:spPr>
-          <a:xfrm>
-            <a:off x="7184571" y="182880"/>
-            <a:ext cx="1968138" cy="369332"/>
-          </a:xfrm>
-          <a:prstGeom prst="rect">
-            <a:avLst/>
-          </a:prstGeom>
-          <a:noFill/>
-        </p:spPr>
-        <p:txBody>
-          <a:bodyPr wrap="square" rtlCol="0">
-            <a:spAutoFit/>
-          </a:bodyPr>
-          <a:lstStyle/>
-          <a:p>
-            <a:r>
-              <a:rPr lang="en-US" dirty="0" smtClean="0"/>
-              <a:t>Book example</a:t>
-            </a:r>
-          </a:p>
-        </p:txBody>
-      </p:sp>
-      <p:sp>
-        <p:nvSpPr>
-          <p:cNvPr id="15" name="TextBox 14"/>
-          <p:cNvSpPr txBox="1"/>
-          <p:nvPr/>
-        </p:nvSpPr>
-        <p:spPr>
-          <a:xfrm>
-            <a:off x="4876800" y="3135003"/>
-            <a:ext cx="2307771" cy="923330"/>
-          </a:xfrm>
-          <a:prstGeom prst="rect">
-            <a:avLst/>
-          </a:prstGeom>
-          <a:noFill/>
-        </p:spPr>
-        <p:txBody>
-          <a:bodyPr wrap="square" rtlCol="0">
-            <a:spAutoFit/>
-          </a:bodyPr>
-          <a:lstStyle/>
-          <a:p>
-            <a:r>
-              <a:rPr lang="en-US" dirty="0" smtClean="0"/>
-              <a:t>Copy of the book with </a:t>
-            </a:r>
-            <a:r>
-              <a:rPr lang="en-US" dirty="0"/>
-              <a:t>id=2 </a:t>
-            </a:r>
-            <a:r>
-              <a:rPr lang="en-US" dirty="0" smtClean="0"/>
-              <a:t>in </a:t>
-            </a:r>
-            <a:r>
-              <a:rPr lang="en-US" dirty="0"/>
-              <a:t>the hands of the user</a:t>
-            </a:r>
-            <a:endParaRPr lang="ru-RU" dirty="0"/>
-          </a:p>
-        </p:txBody>
-      </p:sp>
       <p:pic>
         <p:nvPicPr>
-          <p:cNvPr id="16" name="Рисунок 15"/>
+          <p:cNvPr id="8" name="Рисунок 7"/>
           <p:cNvPicPr>
             <a:picLocks noChangeAspect="1"/>
           </p:cNvPicPr>
@@ -3648,48 +4008,18 @@
         </p:blipFill>
         <p:spPr>
           <a:xfrm>
-            <a:off x="4432304" y="4058333"/>
-            <a:ext cx="3666667" cy="2371429"/>
+            <a:off x="515757" y="4414498"/>
+            <a:ext cx="7142857" cy="1447619"/>
           </a:xfrm>
           <a:prstGeom prst="rect">
             <a:avLst/>
           </a:prstGeom>
         </p:spPr>
       </p:pic>
-      <p:sp>
-        <p:nvSpPr>
-          <p:cNvPr id="3" name="TextBox 2"/>
-          <p:cNvSpPr txBox="1"/>
-          <p:nvPr/>
-        </p:nvSpPr>
-        <p:spPr>
-          <a:xfrm>
-            <a:off x="8316686" y="3596668"/>
-            <a:ext cx="2124891" cy="2308324"/>
-          </a:xfrm>
-          <a:prstGeom prst="rect">
-            <a:avLst/>
-          </a:prstGeom>
-          <a:noFill/>
-        </p:spPr>
-        <p:txBody>
-          <a:bodyPr wrap="square" rtlCol="0">
-            <a:spAutoFit/>
-          </a:bodyPr>
-          <a:lstStyle/>
-          <a:p>
-            <a:r>
-              <a:rPr lang="en-US" sz="3600" dirty="0" smtClean="0"/>
-              <a:t>Examples of database entries</a:t>
-            </a:r>
-            <a:endParaRPr lang="ru-RU" sz="3600" dirty="0"/>
-          </a:p>
-        </p:txBody>
-      </p:sp>
     </p:spTree>
     <p:extLst>
       <p:ext uri="{BB962C8B-B14F-4D97-AF65-F5344CB8AC3E}">
-        <p14:creationId xmlns:p14="http://schemas.microsoft.com/office/powerpoint/2010/main" val="3804174267"/>
+        <p14:creationId xmlns:p14="http://schemas.microsoft.com/office/powerpoint/2010/main" val="1853569093"/>
       </p:ext>
     </p:extLst>
   </p:cSld>

</xml_diff>